<commit_message>
Update the progress roadmap milestone diagram.
</commit_message>
<xml_diff>
--- a/Reference_Implementation/images/progress_milestone.pptx
+++ b/Reference_Implementation/images/progress_milestone.pptx
@@ -5047,9 +5047,9 @@
           <p:nvPr/>
         </p:nvCxnSpPr>
         <p:spPr>
-          <a:xfrm>
-            <a:off x="6697345" y="3997643"/>
-            <a:ext cx="3744595" cy="0"/>
+          <a:xfrm flipV="1">
+            <a:off x="8348345" y="3997643"/>
+            <a:ext cx="2093595" cy="0"/>
           </a:xfrm>
           <a:prstGeom prst="straightConnector1">
             <a:avLst/>
@@ -5078,324 +5078,6 @@
           </a:fontRef>
         </p:style>
       </p:cxnSp>
-      <p:grpSp>
-        <p:nvGrpSpPr>
-          <p:cNvPr id="26" name="组合 25"/>
-          <p:cNvGrpSpPr/>
-          <p:nvPr/>
-        </p:nvGrpSpPr>
-        <p:grpSpPr>
-          <a:xfrm>
-            <a:off x="7159625" y="3634105"/>
-            <a:ext cx="828040" cy="772795"/>
-            <a:chOff x="10164" y="4348"/>
-            <a:chExt cx="1304" cy="1217"/>
-          </a:xfrm>
-        </p:grpSpPr>
-        <p:sp>
-          <p:nvSpPr>
-            <p:cNvPr id="90" name="文本框 75"/>
-            <p:cNvSpPr txBox="1"/>
-            <p:nvPr/>
-          </p:nvSpPr>
-          <p:spPr>
-            <a:xfrm>
-              <a:off x="10164" y="5155"/>
-              <a:ext cx="1304" cy="410"/>
-            </a:xfrm>
-            <a:prstGeom prst="rect">
-              <a:avLst/>
-            </a:prstGeom>
-            <a:noFill/>
-          </p:spPr>
-          <p:txBody>
-            <a:bodyPr wrap="square">
-              <a:spAutoFit/>
-            </a:bodyPr>
-            <a:lstStyle>
-              <a:defPPr>
-                <a:defRPr lang="zh-CN"/>
-              </a:defPPr>
-              <a:lvl1pPr>
-                <a:defRPr sz="1600" b="1" spc="30">
-                  <a:solidFill>
-                    <a:schemeClr val="bg1"/>
-                  </a:solidFill>
-                  <a:latin typeface="思源黑体" panose="020B0500000000000000" pitchFamily="34" charset="-122"/>
-                  <a:ea typeface="思源黑体" panose="020B0500000000000000" pitchFamily="34" charset="-122"/>
-                </a:defRPr>
-              </a:lvl1pPr>
-            </a:lstStyle>
-            <a:p>
-              <a:pPr marL="0" marR="0" lvl="7" algn="ctr" defTabSz="914400" rtl="0" eaLnBrk="1" fontAlgn="auto" latinLnBrk="0" hangingPunct="1">
-                <a:lnSpc>
-                  <a:spcPct val="100000"/>
-                </a:lnSpc>
-                <a:spcBef>
-                  <a:spcPts val="425"/>
-                </a:spcBef>
-                <a:spcAft>
-                  <a:spcPts val="0"/>
-                </a:spcAft>
-                <a:buClr>
-                  <a:srgbClr val="3A6BA0"/>
-                </a:buClr>
-                <a:buSzPct val="94000"/>
-                <a:buFontTx/>
-                <a:buNone/>
-                <a:tabLst>
-                  <a:tab pos="179705" algn="l"/>
-                </a:tabLst>
-                <a:defRPr/>
-              </a:pPr>
-              <a:r>
-                <a:rPr kumimoji="0" lang="en-US" altLang="zh-CN" sz="1100" b="1" i="0" u="none" strike="noStrike" kern="1200" cap="none" spc="30" normalizeH="0" baseline="0" noProof="0" dirty="0">
-                  <a:ln>
-                    <a:noFill/>
-                  </a:ln>
-                  <a:solidFill>
-                    <a:schemeClr val="tx1">
-                      <a:lumMod val="50000"/>
-                      <a:lumOff val="50000"/>
-                    </a:schemeClr>
-                  </a:solidFill>
-                  <a:effectLst/>
-                  <a:uLnTx/>
-                  <a:uFillTx/>
-                  <a:latin typeface="Courier New" panose="02070309020205020404" charset="0"/>
-                  <a:ea typeface="微软雅黑" panose="020B0503020204020204" charset="-122"/>
-                  <a:cs typeface="Courier New" panose="02070309020205020404" charset="0"/>
-                </a:rPr>
-                <a:t>2024.6</a:t>
-              </a:r>
-              <a:endParaRPr kumimoji="0" lang="en-US" altLang="zh-CN" sz="1100" b="1" i="0" u="none" strike="noStrike" kern="1200" cap="none" spc="30" normalizeH="0" baseline="0" noProof="0" dirty="0">
-                <a:ln>
-                  <a:noFill/>
-                </a:ln>
-                <a:solidFill>
-                  <a:schemeClr val="tx1">
-                    <a:lumMod val="50000"/>
-                    <a:lumOff val="50000"/>
-                  </a:schemeClr>
-                </a:solidFill>
-                <a:effectLst/>
-                <a:uLnTx/>
-                <a:uFillTx/>
-                <a:latin typeface="Courier New" panose="02070309020205020404" charset="0"/>
-                <a:ea typeface="微软雅黑" panose="020B0503020204020204" charset="-122"/>
-                <a:cs typeface="Courier New" panose="02070309020205020404" charset="0"/>
-              </a:endParaRPr>
-            </a:p>
-          </p:txBody>
-        </p:sp>
-        <p:grpSp>
-          <p:nvGrpSpPr>
-            <p:cNvPr id="18" name="组合 17"/>
-            <p:cNvGrpSpPr/>
-            <p:nvPr/>
-          </p:nvGrpSpPr>
-          <p:grpSpPr>
-            <a:xfrm>
-              <a:off x="10634" y="4348"/>
-              <a:ext cx="364" cy="751"/>
-              <a:chOff x="10652" y="4348"/>
-              <a:chExt cx="364" cy="751"/>
-            </a:xfrm>
-          </p:grpSpPr>
-          <p:sp>
-            <p:nvSpPr>
-              <p:cNvPr id="3" name="椭圆 51"/>
-              <p:cNvSpPr/>
-              <p:nvPr/>
-            </p:nvSpPr>
-            <p:spPr>
-              <a:xfrm>
-                <a:off x="10652" y="4735"/>
-                <a:ext cx="365" cy="365"/>
-              </a:xfrm>
-              <a:prstGeom prst="ellipse">
-                <a:avLst/>
-              </a:prstGeom>
-              <a:solidFill>
-                <a:schemeClr val="bg1">
-                  <a:lumMod val="65000"/>
-                </a:schemeClr>
-              </a:solidFill>
-              <a:ln>
-                <a:noFill/>
-              </a:ln>
-            </p:spPr>
-            <p:style>
-              <a:lnRef idx="2">
-                <a:schemeClr val="accent1">
-                  <a:shade val="50000"/>
-                </a:schemeClr>
-              </a:lnRef>
-              <a:fillRef idx="1">
-                <a:schemeClr val="accent1"/>
-              </a:fillRef>
-              <a:effectRef idx="0">
-                <a:schemeClr val="accent1"/>
-              </a:effectRef>
-              <a:fontRef idx="minor">
-                <a:schemeClr val="lt1"/>
-              </a:fontRef>
-            </p:style>
-            <p:txBody>
-              <a:bodyPr anchor="ctr"/>
-              <a:p>
-                <a:pPr marL="0" marR="0" lvl="0" indent="0" algn="ctr" defTabSz="914400" rtl="0" eaLnBrk="0" fontAlgn="base" latinLnBrk="0" hangingPunct="0">
-                  <a:lnSpc>
-                    <a:spcPct val="100000"/>
-                  </a:lnSpc>
-                  <a:spcBef>
-                    <a:spcPct val="0"/>
-                  </a:spcBef>
-                  <a:spcAft>
-                    <a:spcPct val="0"/>
-                  </a:spcAft>
-                  <a:buClrTx/>
-                  <a:buSzTx/>
-                  <a:buFontTx/>
-                  <a:buNone/>
-                  <a:defRPr/>
-                </a:pPr>
-                <a:endParaRPr kumimoji="0" lang="zh-CN" altLang="en-US" sz="1600" b="0" i="0" u="none" strike="noStrike" kern="1200" cap="none" spc="0" normalizeH="0" baseline="0" noProof="0" dirty="0">
-                  <a:ln>
-                    <a:noFill/>
-                  </a:ln>
-                  <a:solidFill>
-                    <a:schemeClr val="tx1">
-                      <a:lumMod val="50000"/>
-                      <a:lumOff val="50000"/>
-                    </a:schemeClr>
-                  </a:solidFill>
-                  <a:effectLst/>
-                  <a:uLnTx/>
-                  <a:uFillTx/>
-                  <a:latin typeface="微软雅黑" panose="020B0503020204020204" charset="-122"/>
-                  <a:ea typeface="+mn-ea"/>
-                  <a:cs typeface="+mn-cs"/>
-                </a:endParaRPr>
-              </a:p>
-            </p:txBody>
-          </p:sp>
-          <p:sp>
-            <p:nvSpPr>
-              <p:cNvPr id="11" name="椭圆 52"/>
-              <p:cNvSpPr/>
-              <p:nvPr/>
-            </p:nvSpPr>
-            <p:spPr>
-              <a:xfrm>
-                <a:off x="10716" y="4793"/>
-                <a:ext cx="247" cy="250"/>
-              </a:xfrm>
-              <a:prstGeom prst="ellipse">
-                <a:avLst/>
-              </a:prstGeom>
-              <a:solidFill>
-                <a:schemeClr val="bg1"/>
-              </a:solidFill>
-              <a:ln>
-                <a:noFill/>
-              </a:ln>
-            </p:spPr>
-            <p:style>
-              <a:lnRef idx="2">
-                <a:schemeClr val="accent1">
-                  <a:shade val="50000"/>
-                </a:schemeClr>
-              </a:lnRef>
-              <a:fillRef idx="1">
-                <a:schemeClr val="accent1"/>
-              </a:fillRef>
-              <a:effectRef idx="0">
-                <a:schemeClr val="accent1"/>
-              </a:effectRef>
-              <a:fontRef idx="minor">
-                <a:schemeClr val="lt1"/>
-              </a:fontRef>
-            </p:style>
-            <p:txBody>
-              <a:bodyPr anchor="ctr"/>
-              <a:p>
-                <a:pPr marL="0" marR="0" lvl="0" indent="0" algn="ctr" defTabSz="914400" rtl="0" eaLnBrk="0" fontAlgn="base" latinLnBrk="0" hangingPunct="0">
-                  <a:lnSpc>
-                    <a:spcPct val="100000"/>
-                  </a:lnSpc>
-                  <a:spcBef>
-                    <a:spcPct val="0"/>
-                  </a:spcBef>
-                  <a:spcAft>
-                    <a:spcPct val="0"/>
-                  </a:spcAft>
-                  <a:buClrTx/>
-                  <a:buSzTx/>
-                  <a:buFontTx/>
-                  <a:buNone/>
-                  <a:defRPr/>
-                </a:pPr>
-                <a:endParaRPr kumimoji="0" lang="zh-CN" altLang="en-US" sz="1600" b="0" i="0" u="none" strike="noStrike" kern="1200" cap="none" spc="0" normalizeH="0" baseline="0" noProof="0">
-                  <a:ln>
-                    <a:noFill/>
-                  </a:ln>
-                  <a:solidFill>
-                    <a:schemeClr val="tx1">
-                      <a:lumMod val="50000"/>
-                      <a:lumOff val="50000"/>
-                    </a:schemeClr>
-                  </a:solidFill>
-                  <a:effectLst/>
-                  <a:uLnTx/>
-                  <a:uFillTx/>
-                  <a:latin typeface="微软雅黑" panose="020B0503020204020204" charset="-122"/>
-                  <a:ea typeface="+mn-ea"/>
-                  <a:cs typeface="+mn-cs"/>
-                </a:endParaRPr>
-              </a:p>
-            </p:txBody>
-          </p:sp>
-          <p:cxnSp>
-            <p:nvCxnSpPr>
-              <p:cNvPr id="17" name="Straight Arrow Connector 64"/>
-              <p:cNvCxnSpPr/>
-              <p:nvPr/>
-            </p:nvCxnSpPr>
-            <p:spPr>
-              <a:xfrm rot="10800000" flipV="1">
-                <a:off x="10835" y="4348"/>
-                <a:ext cx="0" cy="340"/>
-              </a:xfrm>
-              <a:prstGeom prst="straightConnector1">
-                <a:avLst/>
-              </a:prstGeom>
-              <a:ln w="28575">
-                <a:solidFill>
-                  <a:schemeClr val="bg1">
-                    <a:lumMod val="65000"/>
-                  </a:schemeClr>
-                </a:solidFill>
-                <a:tailEnd type="triangle" w="med" len="lg"/>
-              </a:ln>
-            </p:spPr>
-            <p:style>
-              <a:lnRef idx="1">
-                <a:schemeClr val="accent1"/>
-              </a:lnRef>
-              <a:fillRef idx="0">
-                <a:schemeClr val="accent1"/>
-              </a:fillRef>
-              <a:effectRef idx="0">
-                <a:schemeClr val="accent1"/>
-              </a:effectRef>
-              <a:fontRef idx="minor">
-                <a:schemeClr val="tx1"/>
-              </a:fontRef>
-            </p:style>
-          </p:cxnSp>
-        </p:grpSp>
-      </p:grpSp>
       <p:grpSp>
         <p:nvGrpSpPr>
           <p:cNvPr id="48" name="组合 47"/>
@@ -6074,6 +5756,323 @@
           </a:prstGeom>
         </p:spPr>
       </p:pic>
+      <p:grpSp>
+        <p:nvGrpSpPr>
+          <p:cNvPr id="41" name="组合 40"/>
+          <p:cNvGrpSpPr/>
+          <p:nvPr/>
+        </p:nvGrpSpPr>
+        <p:grpSpPr>
+          <a:xfrm>
+            <a:off x="7181215" y="3637280"/>
+            <a:ext cx="808355" cy="772795"/>
+            <a:chOff x="8124" y="4348"/>
+            <a:chExt cx="1273" cy="1217"/>
+          </a:xfrm>
+        </p:grpSpPr>
+        <p:sp>
+          <p:nvSpPr>
+            <p:cNvPr id="57" name="文本框 75"/>
+            <p:cNvSpPr txBox="1"/>
+            <p:nvPr/>
+          </p:nvSpPr>
+          <p:spPr>
+            <a:xfrm>
+              <a:off x="8124" y="5155"/>
+              <a:ext cx="1273" cy="410"/>
+            </a:xfrm>
+            <a:prstGeom prst="rect">
+              <a:avLst/>
+            </a:prstGeom>
+            <a:noFill/>
+          </p:spPr>
+          <p:txBody>
+            <a:bodyPr wrap="square">
+              <a:spAutoFit/>
+            </a:bodyPr>
+            <a:lstStyle>
+              <a:defPPr>
+                <a:defRPr lang="zh-CN"/>
+              </a:defPPr>
+              <a:lvl1pPr>
+                <a:defRPr sz="1600" b="1" spc="30">
+                  <a:solidFill>
+                    <a:schemeClr val="bg1"/>
+                  </a:solidFill>
+                  <a:latin typeface="思源黑体" panose="020B0500000000000000" pitchFamily="34" charset="-122"/>
+                  <a:ea typeface="思源黑体" panose="020B0500000000000000" pitchFamily="34" charset="-122"/>
+                </a:defRPr>
+              </a:lvl1pPr>
+            </a:lstStyle>
+            <a:p>
+              <a:pPr marL="0" marR="0" lvl="7" algn="ctr" defTabSz="914400" rtl="0" eaLnBrk="1" fontAlgn="auto" latinLnBrk="0" hangingPunct="1">
+                <a:lnSpc>
+                  <a:spcPct val="100000"/>
+                </a:lnSpc>
+                <a:spcBef>
+                  <a:spcPts val="425"/>
+                </a:spcBef>
+                <a:spcAft>
+                  <a:spcPts val="0"/>
+                </a:spcAft>
+                <a:buClr>
+                  <a:srgbClr val="3A6BA0"/>
+                </a:buClr>
+                <a:buSzPct val="94000"/>
+                <a:buFontTx/>
+                <a:buNone/>
+                <a:tabLst>
+                  <a:tab pos="179705" algn="l"/>
+                </a:tabLst>
+                <a:defRPr/>
+              </a:pPr>
+              <a:r>
+                <a:rPr kumimoji="0" lang="en-US" altLang="zh-CN" sz="1100" b="1" i="0" u="none" strike="noStrike" kern="1200" cap="none" spc="30" normalizeH="0" baseline="0" noProof="0" dirty="0">
+                  <a:ln>
+                    <a:noFill/>
+                  </a:ln>
+                  <a:solidFill>
+                    <a:schemeClr val="tx1"/>
+                  </a:solidFill>
+                  <a:effectLst/>
+                  <a:uLnTx/>
+                  <a:uFillTx/>
+                  <a:latin typeface="Courier New" panose="02070309020205020404" charset="0"/>
+                  <a:ea typeface="微软雅黑" panose="020B0503020204020204" charset="-122"/>
+                  <a:cs typeface="Courier New" panose="02070309020205020404" charset="0"/>
+                </a:rPr>
+                <a:t>2024.6</a:t>
+              </a:r>
+              <a:endParaRPr kumimoji="0" lang="en-US" altLang="zh-CN" sz="1100" b="1" i="0" u="none" strike="noStrike" kern="1200" cap="none" spc="30" normalizeH="0" baseline="0" noProof="0" dirty="0">
+                <a:ln>
+                  <a:noFill/>
+                </a:ln>
+                <a:solidFill>
+                  <a:schemeClr val="tx1"/>
+                </a:solidFill>
+                <a:effectLst/>
+                <a:uLnTx/>
+                <a:uFillTx/>
+                <a:latin typeface="Courier New" panose="02070309020205020404" charset="0"/>
+                <a:ea typeface="微软雅黑" panose="020B0503020204020204" charset="-122"/>
+                <a:cs typeface="Courier New" panose="02070309020205020404" charset="0"/>
+              </a:endParaRPr>
+            </a:p>
+          </p:txBody>
+        </p:sp>
+        <p:grpSp>
+          <p:nvGrpSpPr>
+            <p:cNvPr id="59" name="组合 58"/>
+            <p:cNvGrpSpPr/>
+            <p:nvPr/>
+          </p:nvGrpSpPr>
+          <p:grpSpPr>
+            <a:xfrm>
+              <a:off x="8579" y="4348"/>
+              <a:ext cx="364" cy="751"/>
+              <a:chOff x="6860" y="3969"/>
+              <a:chExt cx="364" cy="751"/>
+            </a:xfrm>
+          </p:grpSpPr>
+          <p:grpSp>
+            <p:nvGrpSpPr>
+              <p:cNvPr id="60" name="组合 50"/>
+              <p:cNvGrpSpPr/>
+              <p:nvPr/>
+            </p:nvGrpSpPr>
+            <p:grpSpPr>
+              <a:xfrm>
+                <a:off x="6860" y="4356"/>
+                <a:ext cx="365" cy="365"/>
+                <a:chOff x="5784850" y="2794000"/>
+                <a:chExt cx="406398" cy="406398"/>
+              </a:xfrm>
+            </p:grpSpPr>
+            <p:sp>
+              <p:nvSpPr>
+                <p:cNvPr id="61" name="椭圆 51"/>
+                <p:cNvSpPr/>
+                <p:nvPr/>
+              </p:nvSpPr>
+              <p:spPr>
+                <a:xfrm>
+                  <a:off x="5784850" y="2794000"/>
+                  <a:ext cx="406398" cy="406398"/>
+                </a:xfrm>
+                <a:prstGeom prst="ellipse">
+                  <a:avLst/>
+                </a:prstGeom>
+                <a:solidFill>
+                  <a:srgbClr val="5B337B"/>
+                </a:solidFill>
+                <a:ln>
+                  <a:noFill/>
+                </a:ln>
+              </p:spPr>
+              <p:style>
+                <a:lnRef idx="2">
+                  <a:schemeClr val="accent1">
+                    <a:shade val="50000"/>
+                  </a:schemeClr>
+                </a:lnRef>
+                <a:fillRef idx="1">
+                  <a:schemeClr val="accent1"/>
+                </a:fillRef>
+                <a:effectRef idx="0">
+                  <a:schemeClr val="accent1"/>
+                </a:effectRef>
+                <a:fontRef idx="minor">
+                  <a:schemeClr val="lt1"/>
+                </a:fontRef>
+              </p:style>
+              <p:txBody>
+                <a:bodyPr anchor="ctr"/>
+                <a:p>
+                  <a:pPr marL="0" marR="0" lvl="0" indent="0" algn="ctr" defTabSz="914400" rtl="0" eaLnBrk="0" fontAlgn="base" latinLnBrk="0" hangingPunct="0">
+                    <a:lnSpc>
+                      <a:spcPct val="100000"/>
+                    </a:lnSpc>
+                    <a:spcBef>
+                      <a:spcPct val="0"/>
+                    </a:spcBef>
+                    <a:spcAft>
+                      <a:spcPct val="0"/>
+                    </a:spcAft>
+                    <a:buClrTx/>
+                    <a:buSzTx/>
+                    <a:buFontTx/>
+                    <a:buNone/>
+                    <a:defRPr/>
+                  </a:pPr>
+                  <a:endParaRPr kumimoji="0" lang="zh-CN" altLang="en-US" sz="1600" b="0" i="0" u="none" strike="noStrike" kern="1200" cap="none" spc="0" normalizeH="0" baseline="0" noProof="0" dirty="0">
+                    <a:ln>
+                      <a:noFill/>
+                    </a:ln>
+                    <a:solidFill>
+                      <a:schemeClr val="tx1"/>
+                    </a:solidFill>
+                    <a:effectLst/>
+                    <a:uLnTx/>
+                    <a:uFillTx/>
+                    <a:latin typeface="微软雅黑" panose="020B0503020204020204" charset="-122"/>
+                    <a:ea typeface="+mn-ea"/>
+                    <a:cs typeface="+mn-cs"/>
+                  </a:endParaRPr>
+                </a:p>
+              </p:txBody>
+            </p:sp>
+            <p:sp>
+              <p:nvSpPr>
+                <p:cNvPr id="62" name="椭圆 52"/>
+                <p:cNvSpPr/>
+                <p:nvPr/>
+              </p:nvSpPr>
+              <p:spPr>
+                <a:xfrm>
+                  <a:off x="5854440" y="2858022"/>
+                  <a:ext cx="275570" cy="278355"/>
+                </a:xfrm>
+                <a:prstGeom prst="ellipse">
+                  <a:avLst/>
+                </a:prstGeom>
+                <a:solidFill>
+                  <a:schemeClr val="bg1"/>
+                </a:solidFill>
+                <a:ln>
+                  <a:noFill/>
+                </a:ln>
+              </p:spPr>
+              <p:style>
+                <a:lnRef idx="2">
+                  <a:schemeClr val="accent1">
+                    <a:shade val="50000"/>
+                  </a:schemeClr>
+                </a:lnRef>
+                <a:fillRef idx="1">
+                  <a:schemeClr val="accent1"/>
+                </a:fillRef>
+                <a:effectRef idx="0">
+                  <a:schemeClr val="accent1"/>
+                </a:effectRef>
+                <a:fontRef idx="minor">
+                  <a:schemeClr val="lt1"/>
+                </a:fontRef>
+              </p:style>
+              <p:txBody>
+                <a:bodyPr anchor="ctr"/>
+                <a:p>
+                  <a:pPr marL="0" marR="0" lvl="0" indent="0" algn="ctr" defTabSz="914400" rtl="0" eaLnBrk="0" fontAlgn="base" latinLnBrk="0" hangingPunct="0">
+                    <a:lnSpc>
+                      <a:spcPct val="100000"/>
+                    </a:lnSpc>
+                    <a:spcBef>
+                      <a:spcPct val="0"/>
+                    </a:spcBef>
+                    <a:spcAft>
+                      <a:spcPct val="0"/>
+                    </a:spcAft>
+                    <a:buClrTx/>
+                    <a:buSzTx/>
+                    <a:buFontTx/>
+                    <a:buNone/>
+                    <a:defRPr/>
+                  </a:pPr>
+                  <a:endParaRPr kumimoji="0" lang="zh-CN" altLang="en-US" sz="1600" b="0" i="0" u="none" strike="noStrike" kern="1200" cap="none" spc="0" normalizeH="0" baseline="0" noProof="0">
+                    <a:ln>
+                      <a:noFill/>
+                    </a:ln>
+                    <a:solidFill>
+                      <a:schemeClr val="tx1"/>
+                    </a:solidFill>
+                    <a:effectLst/>
+                    <a:uLnTx/>
+                    <a:uFillTx/>
+                    <a:latin typeface="微软雅黑" panose="020B0503020204020204" charset="-122"/>
+                    <a:ea typeface="+mn-ea"/>
+                    <a:cs typeface="+mn-cs"/>
+                  </a:endParaRPr>
+                </a:p>
+              </p:txBody>
+            </p:sp>
+          </p:grpSp>
+          <p:cxnSp>
+            <p:nvCxnSpPr>
+              <p:cNvPr id="63" name="Straight Arrow Connector 64"/>
+              <p:cNvCxnSpPr/>
+              <p:nvPr/>
+            </p:nvCxnSpPr>
+            <p:spPr>
+              <a:xfrm rot="10800000" flipV="1">
+                <a:off x="7043" y="3969"/>
+                <a:ext cx="0" cy="340"/>
+              </a:xfrm>
+              <a:prstGeom prst="straightConnector1">
+                <a:avLst/>
+              </a:prstGeom>
+              <a:ln w="28575">
+                <a:solidFill>
+                  <a:srgbClr val="5B337B"/>
+                </a:solidFill>
+                <a:tailEnd type="triangle" w="med" len="lg"/>
+              </a:ln>
+            </p:spPr>
+            <p:style>
+              <a:lnRef idx="1">
+                <a:schemeClr val="accent1"/>
+              </a:lnRef>
+              <a:fillRef idx="0">
+                <a:schemeClr val="accent1"/>
+              </a:fillRef>
+              <a:effectRef idx="0">
+                <a:schemeClr val="accent1"/>
+              </a:effectRef>
+              <a:fontRef idx="minor">
+                <a:schemeClr val="tx1"/>
+              </a:fontRef>
+            </p:style>
+          </p:cxnSp>
+        </p:grpSp>
+      </p:grpSp>
     </p:spTree>
     <p:custDataLst>
       <p:tags r:id="rId16"/>

</xml_diff>